<commit_message>
Added the presentations and solutions to excercises
</commit_message>
<xml_diff>
--- a/pwani_stats/week1/day1/presentations/lesson2_Introduction to 'R'.pptx
+++ b/pwani_stats/week1/day1/presentations/lesson2_Introduction to 'R'.pptx
@@ -916,6 +916,13 @@
     <dgm:pt modelId="{04CC6524-79C5-44C4-B528-AD58EF84A18D}" type="doc">
       <dgm:prSet loTypeId="urn:microsoft.com/office/officeart/2005/8/layout/list1" loCatId="list" qsTypeId="urn:microsoft.com/office/officeart/2005/8/quickstyle/3d5" qsCatId="3D" csTypeId="urn:microsoft.com/office/officeart/2005/8/colors/colorful3" csCatId="colorful" phldr="1"/>
       <dgm:spPr/>
+      <dgm:t>
+        <a:bodyPr/>
+        <a:lstStyle/>
+        <a:p>
+          <a:endParaRPr lang="en-GB"/>
+        </a:p>
+      </dgm:t>
     </dgm:pt>
     <dgm:pt modelId="{C1247418-DD39-4B54-A51A-1BD7C5703CBC}">
       <dgm:prSet phldrT="[Text]"/>
@@ -1000,7 +1007,7 @@
         <a:p>
           <a:r>
             <a:rPr lang="en-GB" dirty="0" smtClean="0"/>
-            <a:t>Integer i.e. 3</a:t>
+            <a:t>Vector</a:t>
           </a:r>
           <a:endParaRPr lang="en-GB" dirty="0"/>
         </a:p>
@@ -1028,43 +1035,6 @@
         </a:p>
       </dgm:t>
     </dgm:pt>
-    <dgm:pt modelId="{7FF08AA4-22EB-4C76-8B6E-36C1CEEA2DC2}">
-      <dgm:prSet phldrT="[Text]"/>
-      <dgm:spPr/>
-      <dgm:t>
-        <a:bodyPr/>
-        <a:lstStyle/>
-        <a:p>
-          <a:r>
-            <a:rPr lang="en-GB" dirty="0" smtClean="0"/>
-            <a:t>Complex i.e. 3i</a:t>
-          </a:r>
-          <a:endParaRPr lang="en-GB" dirty="0"/>
-        </a:p>
-      </dgm:t>
-    </dgm:pt>
-    <dgm:pt modelId="{8D9539B1-244F-4681-9132-D5142C7D486B}" type="parTrans" cxnId="{DEF59E7E-2390-4F60-8BE5-B46C9A18BA4B}">
-      <dgm:prSet/>
-      <dgm:spPr/>
-      <dgm:t>
-        <a:bodyPr/>
-        <a:lstStyle/>
-        <a:p>
-          <a:endParaRPr lang="en-GB"/>
-        </a:p>
-      </dgm:t>
-    </dgm:pt>
-    <dgm:pt modelId="{F2596CB7-C102-47FB-AB09-2E155E99959E}" type="sibTrans" cxnId="{DEF59E7E-2390-4F60-8BE5-B46C9A18BA4B}">
-      <dgm:prSet/>
-      <dgm:spPr/>
-      <dgm:t>
-        <a:bodyPr/>
-        <a:lstStyle/>
-        <a:p>
-          <a:endParaRPr lang="en-GB"/>
-        </a:p>
-      </dgm:t>
-    </dgm:pt>
     <dgm:pt modelId="{FAA9EC86-D8CA-443F-A031-0961BA7BA9A5}">
       <dgm:prSet phldrT="[Text]"/>
       <dgm:spPr/>
@@ -1074,7 +1044,7 @@
         <a:p>
           <a:r>
             <a:rPr lang="en-GB" dirty="0" smtClean="0"/>
-            <a:t>Logical i.e. True False</a:t>
+            <a:t>Factor</a:t>
           </a:r>
           <a:endParaRPr lang="en-GB" dirty="0"/>
         </a:p>
@@ -1092,6 +1062,47 @@
       </dgm:t>
     </dgm:pt>
     <dgm:pt modelId="{37A6B380-95E2-4CBC-B7BA-D9E90BCDC0B6}" type="sibTrans" cxnId="{4C565E84-69AA-4B7C-912F-0AEA45A65687}">
+      <dgm:prSet/>
+      <dgm:spPr/>
+      <dgm:t>
+        <a:bodyPr/>
+        <a:lstStyle/>
+        <a:p>
+          <a:endParaRPr lang="en-GB"/>
+        </a:p>
+      </dgm:t>
+    </dgm:pt>
+    <dgm:pt modelId="{49A45AAA-D9CF-4697-BBC5-650734CFFC6D}">
+      <dgm:prSet/>
+      <dgm:spPr/>
+      <dgm:t>
+        <a:bodyPr/>
+        <a:lstStyle/>
+        <a:p>
+          <a:r>
+            <a:rPr lang="en-GB" dirty="0" smtClean="0"/>
+            <a:t>Logical i.e.</a:t>
+          </a:r>
+          <a:r>
+            <a:rPr lang="en-GB" dirty="0" smtClean="0"/>
+            <a:t> True False</a:t>
+          </a:r>
+          <a:endParaRPr lang="en-GB" dirty="0"/>
+        </a:p>
+      </dgm:t>
+    </dgm:pt>
+    <dgm:pt modelId="{74A1665B-F88E-4437-AEB6-3E72231C9833}" type="parTrans" cxnId="{95E23DB0-80A9-4D90-8BAB-63B3F0C1D232}">
+      <dgm:prSet/>
+      <dgm:spPr/>
+      <dgm:t>
+        <a:bodyPr/>
+        <a:lstStyle/>
+        <a:p>
+          <a:endParaRPr lang="en-GB"/>
+        </a:p>
+      </dgm:t>
+    </dgm:pt>
+    <dgm:pt modelId="{0829370C-B0C3-4714-BD4A-9FCAC82A75DF}" type="sibTrans" cxnId="{95E23DB0-80A9-4D90-8BAB-63B3F0C1D232}">
       <dgm:prSet/>
       <dgm:spPr/>
       <dgm:t>
@@ -1206,12 +1217,59 @@
       <dgm:prSet presAssocID="{B10D4A67-AB44-469D-A151-0D5124325A58}" presName="spaceBetweenRectangles" presStyleCnt="0"/>
       <dgm:spPr/>
     </dgm:pt>
+    <dgm:pt modelId="{A7E823B8-CDC2-4775-A55B-9EB55214E0A8}" type="pres">
+      <dgm:prSet presAssocID="{FAA9EC86-D8CA-443F-A031-0961BA7BA9A5}" presName="parentLin" presStyleCnt="0"/>
+      <dgm:spPr/>
+    </dgm:pt>
+    <dgm:pt modelId="{20102195-C8C1-4514-88D3-5B37A83812FA}" type="pres">
+      <dgm:prSet presAssocID="{FAA9EC86-D8CA-443F-A031-0961BA7BA9A5}" presName="parentLeftMargin" presStyleLbl="node1" presStyleIdx="1" presStyleCnt="5"/>
+      <dgm:spPr/>
+      <dgm:t>
+        <a:bodyPr/>
+        <a:lstStyle/>
+        <a:p>
+          <a:endParaRPr lang="en-GB"/>
+        </a:p>
+      </dgm:t>
+    </dgm:pt>
+    <dgm:pt modelId="{30EE6322-66A0-4A37-AFF8-8ECAC310E94A}" type="pres">
+      <dgm:prSet presAssocID="{FAA9EC86-D8CA-443F-A031-0961BA7BA9A5}" presName="parentText" presStyleLbl="node1" presStyleIdx="2" presStyleCnt="5">
+        <dgm:presLayoutVars>
+          <dgm:chMax val="0"/>
+          <dgm:bulletEnabled val="1"/>
+        </dgm:presLayoutVars>
+      </dgm:prSet>
+      <dgm:spPr/>
+      <dgm:t>
+        <a:bodyPr/>
+        <a:lstStyle/>
+        <a:p>
+          <a:endParaRPr lang="en-GB"/>
+        </a:p>
+      </dgm:t>
+    </dgm:pt>
+    <dgm:pt modelId="{45827FF5-8931-4EC1-958F-2FB14438B48D}" type="pres">
+      <dgm:prSet presAssocID="{FAA9EC86-D8CA-443F-A031-0961BA7BA9A5}" presName="negativeSpace" presStyleCnt="0"/>
+      <dgm:spPr/>
+    </dgm:pt>
+    <dgm:pt modelId="{46854411-9485-40FF-AA96-6C407C4304C3}" type="pres">
+      <dgm:prSet presAssocID="{FAA9EC86-D8CA-443F-A031-0961BA7BA9A5}" presName="childText" presStyleLbl="conFgAcc1" presStyleIdx="2" presStyleCnt="5">
+        <dgm:presLayoutVars>
+          <dgm:bulletEnabled val="1"/>
+        </dgm:presLayoutVars>
+      </dgm:prSet>
+      <dgm:spPr/>
+    </dgm:pt>
+    <dgm:pt modelId="{CA9577AB-1E4C-46E9-837C-0CFAFBE6C91C}" type="pres">
+      <dgm:prSet presAssocID="{37A6B380-95E2-4CBC-B7BA-D9E90BCDC0B6}" presName="spaceBetweenRectangles" presStyleCnt="0"/>
+      <dgm:spPr/>
+    </dgm:pt>
     <dgm:pt modelId="{82F01AF5-0B76-4308-95D4-494ADAF95BC4}" type="pres">
       <dgm:prSet presAssocID="{974C2BE8-F6DA-40BB-AD76-AB4ED73EB3DE}" presName="parentLin" presStyleCnt="0"/>
       <dgm:spPr/>
     </dgm:pt>
     <dgm:pt modelId="{4D69E289-C586-4F0E-BA58-A9F64710D379}" type="pres">
-      <dgm:prSet presAssocID="{974C2BE8-F6DA-40BB-AD76-AB4ED73EB3DE}" presName="parentLeftMargin" presStyleLbl="node1" presStyleIdx="1" presStyleCnt="5"/>
+      <dgm:prSet presAssocID="{974C2BE8-F6DA-40BB-AD76-AB4ED73EB3DE}" presName="parentLeftMargin" presStyleLbl="node1" presStyleIdx="2" presStyleCnt="5"/>
       <dgm:spPr/>
       <dgm:t>
         <a:bodyPr/>
@@ -1222,7 +1280,7 @@
       </dgm:t>
     </dgm:pt>
     <dgm:pt modelId="{89BD58FB-390D-4CDE-A282-0ECA0F33770C}" type="pres">
-      <dgm:prSet presAssocID="{974C2BE8-F6DA-40BB-AD76-AB4ED73EB3DE}" presName="parentText" presStyleLbl="node1" presStyleIdx="2" presStyleCnt="5">
+      <dgm:prSet presAssocID="{974C2BE8-F6DA-40BB-AD76-AB4ED73EB3DE}" presName="parentText" presStyleLbl="node1" presStyleIdx="3" presStyleCnt="5">
         <dgm:presLayoutVars>
           <dgm:chMax val="0"/>
           <dgm:bulletEnabled val="1"/>
@@ -1242,7 +1300,7 @@
       <dgm:spPr/>
     </dgm:pt>
     <dgm:pt modelId="{7E2D7331-2008-4CFF-BE05-5DB6F177B086}" type="pres">
-      <dgm:prSet presAssocID="{974C2BE8-F6DA-40BB-AD76-AB4ED73EB3DE}" presName="childText" presStyleLbl="conFgAcc1" presStyleIdx="2" presStyleCnt="5">
+      <dgm:prSet presAssocID="{974C2BE8-F6DA-40BB-AD76-AB4ED73EB3DE}" presName="childText" presStyleLbl="conFgAcc1" presStyleIdx="3" presStyleCnt="5">
         <dgm:presLayoutVars>
           <dgm:bulletEnabled val="1"/>
         </dgm:presLayoutVars>
@@ -1253,23 +1311,16 @@
       <dgm:prSet presAssocID="{F1CB7C3B-AC65-48F1-81EC-088A2D90269D}" presName="spaceBetweenRectangles" presStyleCnt="0"/>
       <dgm:spPr/>
     </dgm:pt>
-    <dgm:pt modelId="{A5CFC4D5-4052-43A6-8A33-1928B3128498}" type="pres">
-      <dgm:prSet presAssocID="{7FF08AA4-22EB-4C76-8B6E-36C1CEEA2DC2}" presName="parentLin" presStyleCnt="0"/>
+    <dgm:pt modelId="{F4E3617F-623C-4170-9CFA-357C8761B5DB}" type="pres">
+      <dgm:prSet presAssocID="{49A45AAA-D9CF-4697-BBC5-650734CFFC6D}" presName="parentLin" presStyleCnt="0"/>
       <dgm:spPr/>
     </dgm:pt>
-    <dgm:pt modelId="{7DA724D7-70C6-475C-86FC-F690CB727F2A}" type="pres">
-      <dgm:prSet presAssocID="{7FF08AA4-22EB-4C76-8B6E-36C1CEEA2DC2}" presName="parentLeftMargin" presStyleLbl="node1" presStyleIdx="2" presStyleCnt="5"/>
+    <dgm:pt modelId="{122F0A4F-6C50-46C1-A3BC-A48A3A668602}" type="pres">
+      <dgm:prSet presAssocID="{49A45AAA-D9CF-4697-BBC5-650734CFFC6D}" presName="parentLeftMargin" presStyleLbl="node1" presStyleIdx="3" presStyleCnt="5"/>
       <dgm:spPr/>
-      <dgm:t>
-        <a:bodyPr/>
-        <a:lstStyle/>
-        <a:p>
-          <a:endParaRPr lang="en-GB"/>
-        </a:p>
-      </dgm:t>
     </dgm:pt>
-    <dgm:pt modelId="{5F37DCE4-F0EF-451B-844C-561BBB752DDA}" type="pres">
-      <dgm:prSet presAssocID="{7FF08AA4-22EB-4C76-8B6E-36C1CEEA2DC2}" presName="parentText" presStyleLbl="node1" presStyleIdx="3" presStyleCnt="5">
+    <dgm:pt modelId="{D2A04B1C-ACA9-4935-B7B9-29446F0FC549}" type="pres">
+      <dgm:prSet presAssocID="{49A45AAA-D9CF-4697-BBC5-650734CFFC6D}" presName="parentText" presStyleLbl="node1" presStyleIdx="4" presStyleCnt="5">
         <dgm:presLayoutVars>
           <dgm:chMax val="0"/>
           <dgm:bulletEnabled val="1"/>
@@ -1284,59 +1335,12 @@
         </a:p>
       </dgm:t>
     </dgm:pt>
-    <dgm:pt modelId="{73D79E5B-2365-4A31-8571-56A99F1AD8FF}" type="pres">
-      <dgm:prSet presAssocID="{7FF08AA4-22EB-4C76-8B6E-36C1CEEA2DC2}" presName="negativeSpace" presStyleCnt="0"/>
+    <dgm:pt modelId="{EB723E5F-73B1-43E6-8438-1D528503F29F}" type="pres">
+      <dgm:prSet presAssocID="{49A45AAA-D9CF-4697-BBC5-650734CFFC6D}" presName="negativeSpace" presStyleCnt="0"/>
       <dgm:spPr/>
     </dgm:pt>
-    <dgm:pt modelId="{41BC2E9A-4248-42BC-A64B-CAAF0FBA0FB3}" type="pres">
-      <dgm:prSet presAssocID="{7FF08AA4-22EB-4C76-8B6E-36C1CEEA2DC2}" presName="childText" presStyleLbl="conFgAcc1" presStyleIdx="3" presStyleCnt="5">
-        <dgm:presLayoutVars>
-          <dgm:bulletEnabled val="1"/>
-        </dgm:presLayoutVars>
-      </dgm:prSet>
-      <dgm:spPr/>
-    </dgm:pt>
-    <dgm:pt modelId="{FD9D1C16-19FF-455B-AFC9-5DBD5EB0AF20}" type="pres">
-      <dgm:prSet presAssocID="{F2596CB7-C102-47FB-AB09-2E155E99959E}" presName="spaceBetweenRectangles" presStyleCnt="0"/>
-      <dgm:spPr/>
-    </dgm:pt>
-    <dgm:pt modelId="{A7E823B8-CDC2-4775-A55B-9EB55214E0A8}" type="pres">
-      <dgm:prSet presAssocID="{FAA9EC86-D8CA-443F-A031-0961BA7BA9A5}" presName="parentLin" presStyleCnt="0"/>
-      <dgm:spPr/>
-    </dgm:pt>
-    <dgm:pt modelId="{20102195-C8C1-4514-88D3-5B37A83812FA}" type="pres">
-      <dgm:prSet presAssocID="{FAA9EC86-D8CA-443F-A031-0961BA7BA9A5}" presName="parentLeftMargin" presStyleLbl="node1" presStyleIdx="3" presStyleCnt="5"/>
-      <dgm:spPr/>
-      <dgm:t>
-        <a:bodyPr/>
-        <a:lstStyle/>
-        <a:p>
-          <a:endParaRPr lang="en-GB"/>
-        </a:p>
-      </dgm:t>
-    </dgm:pt>
-    <dgm:pt modelId="{30EE6322-66A0-4A37-AFF8-8ECAC310E94A}" type="pres">
-      <dgm:prSet presAssocID="{FAA9EC86-D8CA-443F-A031-0961BA7BA9A5}" presName="parentText" presStyleLbl="node1" presStyleIdx="4" presStyleCnt="5">
-        <dgm:presLayoutVars>
-          <dgm:chMax val="0"/>
-          <dgm:bulletEnabled val="1"/>
-        </dgm:presLayoutVars>
-      </dgm:prSet>
-      <dgm:spPr/>
-      <dgm:t>
-        <a:bodyPr/>
-        <a:lstStyle/>
-        <a:p>
-          <a:endParaRPr lang="en-GB"/>
-        </a:p>
-      </dgm:t>
-    </dgm:pt>
-    <dgm:pt modelId="{45827FF5-8931-4EC1-958F-2FB14438B48D}" type="pres">
-      <dgm:prSet presAssocID="{FAA9EC86-D8CA-443F-A031-0961BA7BA9A5}" presName="negativeSpace" presStyleCnt="0"/>
-      <dgm:spPr/>
-    </dgm:pt>
-    <dgm:pt modelId="{46854411-9485-40FF-AA96-6C407C4304C3}" type="pres">
-      <dgm:prSet presAssocID="{FAA9EC86-D8CA-443F-A031-0961BA7BA9A5}" presName="childText" presStyleLbl="conFgAcc1" presStyleIdx="4" presStyleCnt="5">
+    <dgm:pt modelId="{A5DC5035-47E6-41A3-8C90-397CE8632653}" type="pres">
+      <dgm:prSet presAssocID="{49A45AAA-D9CF-4697-BBC5-650734CFFC6D}" presName="childText" presStyleLbl="conFgAcc1" presStyleIdx="4" presStyleCnt="5">
         <dgm:presLayoutVars>
           <dgm:bulletEnabled val="1"/>
         </dgm:presLayoutVars>
@@ -1345,57 +1349,57 @@
     </dgm:pt>
   </dgm:ptLst>
   <dgm:cxnLst>
-    <dgm:cxn modelId="{9C7294DF-B331-4D3E-A08E-4E051A8AE562}" type="presOf" srcId="{91A21DCB-F21E-4567-9955-31AAB97E9E36}" destId="{C7F07FC5-1FE8-4E63-957D-BE853A83486B}" srcOrd="0" destOrd="0" presId="urn:microsoft.com/office/officeart/2005/8/layout/list1"/>
-    <dgm:cxn modelId="{F66A2247-9439-4032-A731-4F0B5E3D0E68}" type="presOf" srcId="{91A21DCB-F21E-4567-9955-31AAB97E9E36}" destId="{FBFDE359-21D9-4AA2-8A36-4A4B49C95B5D}" srcOrd="1" destOrd="0" presId="urn:microsoft.com/office/officeart/2005/8/layout/list1"/>
-    <dgm:cxn modelId="{A44177E7-026D-4799-AB25-470FFD99CDEF}" type="presOf" srcId="{FAA9EC86-D8CA-443F-A031-0961BA7BA9A5}" destId="{20102195-C8C1-4514-88D3-5B37A83812FA}" srcOrd="0" destOrd="0" presId="urn:microsoft.com/office/officeart/2005/8/layout/list1"/>
-    <dgm:cxn modelId="{F9948B9C-096A-444E-A3A7-5C6301199C34}" type="presOf" srcId="{974C2BE8-F6DA-40BB-AD76-AB4ED73EB3DE}" destId="{4D69E289-C586-4F0E-BA58-A9F64710D379}" srcOrd="0" destOrd="0" presId="urn:microsoft.com/office/officeart/2005/8/layout/list1"/>
-    <dgm:cxn modelId="{DEF59E7E-2390-4F60-8BE5-B46C9A18BA4B}" srcId="{04CC6524-79C5-44C4-B528-AD58EF84A18D}" destId="{7FF08AA4-22EB-4C76-8B6E-36C1CEEA2DC2}" srcOrd="3" destOrd="0" parTransId="{8D9539B1-244F-4681-9132-D5142C7D486B}" sibTransId="{F2596CB7-C102-47FB-AB09-2E155E99959E}"/>
-    <dgm:cxn modelId="{E9E88496-F2E2-45E2-AD73-1818DAE42A47}" type="presOf" srcId="{7FF08AA4-22EB-4C76-8B6E-36C1CEEA2DC2}" destId="{7DA724D7-70C6-475C-86FC-F690CB727F2A}" srcOrd="0" destOrd="0" presId="urn:microsoft.com/office/officeart/2005/8/layout/list1"/>
+    <dgm:cxn modelId="{9582FDBE-0EE2-4DDF-84BC-5572139C5719}" type="presOf" srcId="{C1247418-DD39-4B54-A51A-1BD7C5703CBC}" destId="{68D18EA1-1FFF-4444-A131-6E6D5BC65AB5}" srcOrd="1" destOrd="0" presId="urn:microsoft.com/office/officeart/2005/8/layout/list1"/>
     <dgm:cxn modelId="{7F303DF8-6725-4F2D-9F9F-0297A5594B54}" type="presOf" srcId="{04CC6524-79C5-44C4-B528-AD58EF84A18D}" destId="{541B8D79-3F7F-4D84-949A-1EAA66FB1BD7}" srcOrd="0" destOrd="0" presId="urn:microsoft.com/office/officeart/2005/8/layout/list1"/>
-    <dgm:cxn modelId="{68DA8CF8-FEF3-44DA-B4B7-9536354619AC}" type="presOf" srcId="{C1247418-DD39-4B54-A51A-1BD7C5703CBC}" destId="{E0E98AF7-AA50-4F6A-AC37-973012DA7026}" srcOrd="0" destOrd="0" presId="urn:microsoft.com/office/officeart/2005/8/layout/list1"/>
-    <dgm:cxn modelId="{FA036851-9D0E-4BB1-9CCF-857456253762}" srcId="{04CC6524-79C5-44C4-B528-AD58EF84A18D}" destId="{974C2BE8-F6DA-40BB-AD76-AB4ED73EB3DE}" srcOrd="2" destOrd="0" parTransId="{063ECE5E-6B77-4EAB-BBA1-7EE09A76533B}" sibTransId="{F1CB7C3B-AC65-48F1-81EC-088A2D90269D}"/>
+    <dgm:cxn modelId="{1E71F5FD-AD65-43A9-923D-6A3DFA388A30}" type="presOf" srcId="{FAA9EC86-D8CA-443F-A031-0961BA7BA9A5}" destId="{20102195-C8C1-4514-88D3-5B37A83812FA}" srcOrd="0" destOrd="0" presId="urn:microsoft.com/office/officeart/2005/8/layout/list1"/>
+    <dgm:cxn modelId="{05456A53-2243-46D9-9083-7D8BA3036796}" type="presOf" srcId="{49A45AAA-D9CF-4697-BBC5-650734CFFC6D}" destId="{D2A04B1C-ACA9-4935-B7B9-29446F0FC549}" srcOrd="1" destOrd="0" presId="urn:microsoft.com/office/officeart/2005/8/layout/list1"/>
+    <dgm:cxn modelId="{E37B7D07-7D06-462B-8499-EC3DCF9DC53B}" type="presOf" srcId="{974C2BE8-F6DA-40BB-AD76-AB4ED73EB3DE}" destId="{89BD58FB-390D-4CDE-A282-0ECA0F33770C}" srcOrd="1" destOrd="0" presId="urn:microsoft.com/office/officeart/2005/8/layout/list1"/>
+    <dgm:cxn modelId="{E951A699-DCEF-45D5-A158-9B3C5422683D}" type="presOf" srcId="{91A21DCB-F21E-4567-9955-31AAB97E9E36}" destId="{FBFDE359-21D9-4AA2-8A36-4A4B49C95B5D}" srcOrd="1" destOrd="0" presId="urn:microsoft.com/office/officeart/2005/8/layout/list1"/>
+    <dgm:cxn modelId="{FA036851-9D0E-4BB1-9CCF-857456253762}" srcId="{04CC6524-79C5-44C4-B528-AD58EF84A18D}" destId="{974C2BE8-F6DA-40BB-AD76-AB4ED73EB3DE}" srcOrd="3" destOrd="0" parTransId="{063ECE5E-6B77-4EAB-BBA1-7EE09A76533B}" sibTransId="{F1CB7C3B-AC65-48F1-81EC-088A2D90269D}"/>
     <dgm:cxn modelId="{08A05C22-BE60-40BF-B611-9B8EFADD2289}" srcId="{04CC6524-79C5-44C4-B528-AD58EF84A18D}" destId="{91A21DCB-F21E-4567-9955-31AAB97E9E36}" srcOrd="1" destOrd="0" parTransId="{A36D5C9A-8044-42DB-8C61-C9A15B707076}" sibTransId="{B10D4A67-AB44-469D-A151-0D5124325A58}"/>
-    <dgm:cxn modelId="{4C565E84-69AA-4B7C-912F-0AEA45A65687}" srcId="{04CC6524-79C5-44C4-B528-AD58EF84A18D}" destId="{FAA9EC86-D8CA-443F-A031-0961BA7BA9A5}" srcOrd="4" destOrd="0" parTransId="{8A09D598-823B-4D7D-914D-EF81A3DF6B39}" sibTransId="{37A6B380-95E2-4CBC-B7BA-D9E90BCDC0B6}"/>
-    <dgm:cxn modelId="{A7258165-D6D3-494E-986D-075B6C850F61}" type="presOf" srcId="{C1247418-DD39-4B54-A51A-1BD7C5703CBC}" destId="{68D18EA1-1FFF-4444-A131-6E6D5BC65AB5}" srcOrd="1" destOrd="0" presId="urn:microsoft.com/office/officeart/2005/8/layout/list1"/>
-    <dgm:cxn modelId="{3E6AA40C-436F-4251-8DFF-E0C867732292}" type="presOf" srcId="{FAA9EC86-D8CA-443F-A031-0961BA7BA9A5}" destId="{30EE6322-66A0-4A37-AFF8-8ECAC310E94A}" srcOrd="1" destOrd="0" presId="urn:microsoft.com/office/officeart/2005/8/layout/list1"/>
-    <dgm:cxn modelId="{58BA8C97-F4F8-42E4-A764-54FB988FDC67}" type="presOf" srcId="{7FF08AA4-22EB-4C76-8B6E-36C1CEEA2DC2}" destId="{5F37DCE4-F0EF-451B-844C-561BBB752DDA}" srcOrd="1" destOrd="0" presId="urn:microsoft.com/office/officeart/2005/8/layout/list1"/>
-    <dgm:cxn modelId="{6F04F7EE-B74F-40B2-8E6E-D69B468A679A}" type="presOf" srcId="{974C2BE8-F6DA-40BB-AD76-AB4ED73EB3DE}" destId="{89BD58FB-390D-4CDE-A282-0ECA0F33770C}" srcOrd="1" destOrd="0" presId="urn:microsoft.com/office/officeart/2005/8/layout/list1"/>
+    <dgm:cxn modelId="{4C565E84-69AA-4B7C-912F-0AEA45A65687}" srcId="{04CC6524-79C5-44C4-B528-AD58EF84A18D}" destId="{FAA9EC86-D8CA-443F-A031-0961BA7BA9A5}" srcOrd="2" destOrd="0" parTransId="{8A09D598-823B-4D7D-914D-EF81A3DF6B39}" sibTransId="{37A6B380-95E2-4CBC-B7BA-D9E90BCDC0B6}"/>
+    <dgm:cxn modelId="{E25ED30C-0462-4B0F-BA20-41187FEC7AE1}" type="presOf" srcId="{974C2BE8-F6DA-40BB-AD76-AB4ED73EB3DE}" destId="{4D69E289-C586-4F0E-BA58-A9F64710D379}" srcOrd="0" destOrd="0" presId="urn:microsoft.com/office/officeart/2005/8/layout/list1"/>
+    <dgm:cxn modelId="{003C731B-8802-4773-80B9-019C406D04C1}" type="presOf" srcId="{FAA9EC86-D8CA-443F-A031-0961BA7BA9A5}" destId="{30EE6322-66A0-4A37-AFF8-8ECAC310E94A}" srcOrd="1" destOrd="0" presId="urn:microsoft.com/office/officeart/2005/8/layout/list1"/>
+    <dgm:cxn modelId="{1F6CBFD7-73BA-4FF1-A742-CF99B669C884}" type="presOf" srcId="{49A45AAA-D9CF-4697-BBC5-650734CFFC6D}" destId="{122F0A4F-6C50-46C1-A3BC-A48A3A668602}" srcOrd="0" destOrd="0" presId="urn:microsoft.com/office/officeart/2005/8/layout/list1"/>
+    <dgm:cxn modelId="{95E23DB0-80A9-4D90-8BAB-63B3F0C1D232}" srcId="{04CC6524-79C5-44C4-B528-AD58EF84A18D}" destId="{49A45AAA-D9CF-4697-BBC5-650734CFFC6D}" srcOrd="4" destOrd="0" parTransId="{74A1665B-F88E-4437-AEB6-3E72231C9833}" sibTransId="{0829370C-B0C3-4714-BD4A-9FCAC82A75DF}"/>
+    <dgm:cxn modelId="{9519582E-6BD2-45C2-A2C4-F27C2D27A2BC}" type="presOf" srcId="{C1247418-DD39-4B54-A51A-1BD7C5703CBC}" destId="{E0E98AF7-AA50-4F6A-AC37-973012DA7026}" srcOrd="0" destOrd="0" presId="urn:microsoft.com/office/officeart/2005/8/layout/list1"/>
+    <dgm:cxn modelId="{DD7F2BD4-F9AF-42D6-9CCA-6E246E3CD63F}" type="presOf" srcId="{91A21DCB-F21E-4567-9955-31AAB97E9E36}" destId="{C7F07FC5-1FE8-4E63-957D-BE853A83486B}" srcOrd="0" destOrd="0" presId="urn:microsoft.com/office/officeart/2005/8/layout/list1"/>
     <dgm:cxn modelId="{78D35998-F4D0-438B-8A5C-7657B35AECDB}" srcId="{04CC6524-79C5-44C4-B528-AD58EF84A18D}" destId="{C1247418-DD39-4B54-A51A-1BD7C5703CBC}" srcOrd="0" destOrd="0" parTransId="{A48CD36B-D154-4070-A2BC-430C2C949B1D}" sibTransId="{1FDD08CE-80C7-48F6-BCB9-B5A5231EA394}"/>
-    <dgm:cxn modelId="{D6E88C53-28F3-487D-A550-E8C7978788E7}" type="presParOf" srcId="{541B8D79-3F7F-4D84-949A-1EAA66FB1BD7}" destId="{9CA105F4-EDA8-4AFC-A8EC-F370E1154621}" srcOrd="0" destOrd="0" presId="urn:microsoft.com/office/officeart/2005/8/layout/list1"/>
-    <dgm:cxn modelId="{056612EE-2F1B-4B3D-B2DE-520C11EA5576}" type="presParOf" srcId="{9CA105F4-EDA8-4AFC-A8EC-F370E1154621}" destId="{E0E98AF7-AA50-4F6A-AC37-973012DA7026}" srcOrd="0" destOrd="0" presId="urn:microsoft.com/office/officeart/2005/8/layout/list1"/>
-    <dgm:cxn modelId="{ACC33BC1-25D0-4CD4-91CF-6A6D2AF465FA}" type="presParOf" srcId="{9CA105F4-EDA8-4AFC-A8EC-F370E1154621}" destId="{68D18EA1-1FFF-4444-A131-6E6D5BC65AB5}" srcOrd="1" destOrd="0" presId="urn:microsoft.com/office/officeart/2005/8/layout/list1"/>
-    <dgm:cxn modelId="{5E8ACFD4-2900-43FD-98A5-1AB784A9DB0B}" type="presParOf" srcId="{541B8D79-3F7F-4D84-949A-1EAA66FB1BD7}" destId="{242CF14C-3379-4601-AEA0-15844B36348B}" srcOrd="1" destOrd="0" presId="urn:microsoft.com/office/officeart/2005/8/layout/list1"/>
-    <dgm:cxn modelId="{A9FC411D-C35C-4BFF-BCA7-BD178E7446BB}" type="presParOf" srcId="{541B8D79-3F7F-4D84-949A-1EAA66FB1BD7}" destId="{A3C52453-F5F9-4E97-ADD7-39C15C755C5B}" srcOrd="2" destOrd="0" presId="urn:microsoft.com/office/officeart/2005/8/layout/list1"/>
-    <dgm:cxn modelId="{9F66D235-64CB-4D25-AD46-1179D882C905}" type="presParOf" srcId="{541B8D79-3F7F-4D84-949A-1EAA66FB1BD7}" destId="{E54289F6-02BC-43A2-868E-D4BBBDDAD7FE}" srcOrd="3" destOrd="0" presId="urn:microsoft.com/office/officeart/2005/8/layout/list1"/>
-    <dgm:cxn modelId="{6487364F-B8D1-48B9-A663-DDB54A3C61A4}" type="presParOf" srcId="{541B8D79-3F7F-4D84-949A-1EAA66FB1BD7}" destId="{E00BDAA2-75F6-457B-829B-D7333DF8F64F}" srcOrd="4" destOrd="0" presId="urn:microsoft.com/office/officeart/2005/8/layout/list1"/>
-    <dgm:cxn modelId="{A8618269-796A-4D3B-A4B3-9B1E9448BE5B}" type="presParOf" srcId="{E00BDAA2-75F6-457B-829B-D7333DF8F64F}" destId="{C7F07FC5-1FE8-4E63-957D-BE853A83486B}" srcOrd="0" destOrd="0" presId="urn:microsoft.com/office/officeart/2005/8/layout/list1"/>
-    <dgm:cxn modelId="{9CE00DB8-BB51-45FC-9D3B-F981FD9525A8}" type="presParOf" srcId="{E00BDAA2-75F6-457B-829B-D7333DF8F64F}" destId="{FBFDE359-21D9-4AA2-8A36-4A4B49C95B5D}" srcOrd="1" destOrd="0" presId="urn:microsoft.com/office/officeart/2005/8/layout/list1"/>
-    <dgm:cxn modelId="{9E139C9B-3232-4D56-9AE1-2278F3954CE1}" type="presParOf" srcId="{541B8D79-3F7F-4D84-949A-1EAA66FB1BD7}" destId="{F3B03C14-C1C2-44E7-9CA2-D9F42DF7AB92}" srcOrd="5" destOrd="0" presId="urn:microsoft.com/office/officeart/2005/8/layout/list1"/>
-    <dgm:cxn modelId="{38A3B693-8092-46A8-959E-73A07729B8F8}" type="presParOf" srcId="{541B8D79-3F7F-4D84-949A-1EAA66FB1BD7}" destId="{5B7F1806-928E-496E-8A9F-3628E49E2E97}" srcOrd="6" destOrd="0" presId="urn:microsoft.com/office/officeart/2005/8/layout/list1"/>
-    <dgm:cxn modelId="{A9C49D80-7D11-47B0-9B5A-263A5946415D}" type="presParOf" srcId="{541B8D79-3F7F-4D84-949A-1EAA66FB1BD7}" destId="{78D1BF15-311E-40D3-96D0-3C8ACB7E9E3B}" srcOrd="7" destOrd="0" presId="urn:microsoft.com/office/officeart/2005/8/layout/list1"/>
-    <dgm:cxn modelId="{F554E923-E774-4AB1-8358-D1538DB2FA6A}" type="presParOf" srcId="{541B8D79-3F7F-4D84-949A-1EAA66FB1BD7}" destId="{82F01AF5-0B76-4308-95D4-494ADAF95BC4}" srcOrd="8" destOrd="0" presId="urn:microsoft.com/office/officeart/2005/8/layout/list1"/>
-    <dgm:cxn modelId="{EDF2C9F3-FFF7-4D2E-AD7A-843B9FBA0232}" type="presParOf" srcId="{82F01AF5-0B76-4308-95D4-494ADAF95BC4}" destId="{4D69E289-C586-4F0E-BA58-A9F64710D379}" srcOrd="0" destOrd="0" presId="urn:microsoft.com/office/officeart/2005/8/layout/list1"/>
-    <dgm:cxn modelId="{FFAF1D7F-880D-439C-BDD7-A9E3FD1176E0}" type="presParOf" srcId="{82F01AF5-0B76-4308-95D4-494ADAF95BC4}" destId="{89BD58FB-390D-4CDE-A282-0ECA0F33770C}" srcOrd="1" destOrd="0" presId="urn:microsoft.com/office/officeart/2005/8/layout/list1"/>
-    <dgm:cxn modelId="{8885F30A-28FB-43CE-9203-87B833F60ED2}" type="presParOf" srcId="{541B8D79-3F7F-4D84-949A-1EAA66FB1BD7}" destId="{E7FB066C-95DA-46A7-BE13-3EB90FDC6A85}" srcOrd="9" destOrd="0" presId="urn:microsoft.com/office/officeart/2005/8/layout/list1"/>
-    <dgm:cxn modelId="{EEAC903E-9410-4350-A679-4E3835A2CD24}" type="presParOf" srcId="{541B8D79-3F7F-4D84-949A-1EAA66FB1BD7}" destId="{7E2D7331-2008-4CFF-BE05-5DB6F177B086}" srcOrd="10" destOrd="0" presId="urn:microsoft.com/office/officeart/2005/8/layout/list1"/>
-    <dgm:cxn modelId="{E4560E86-807E-432F-840D-897031181D7B}" type="presParOf" srcId="{541B8D79-3F7F-4D84-949A-1EAA66FB1BD7}" destId="{49A4AA14-BC68-49B0-99AE-67ED616408F4}" srcOrd="11" destOrd="0" presId="urn:microsoft.com/office/officeart/2005/8/layout/list1"/>
-    <dgm:cxn modelId="{099D0D6F-C061-4A5F-9621-53A3C83DCE3D}" type="presParOf" srcId="{541B8D79-3F7F-4D84-949A-1EAA66FB1BD7}" destId="{A5CFC4D5-4052-43A6-8A33-1928B3128498}" srcOrd="12" destOrd="0" presId="urn:microsoft.com/office/officeart/2005/8/layout/list1"/>
-    <dgm:cxn modelId="{49874119-2078-457E-935C-01EC1AECF98D}" type="presParOf" srcId="{A5CFC4D5-4052-43A6-8A33-1928B3128498}" destId="{7DA724D7-70C6-475C-86FC-F690CB727F2A}" srcOrd="0" destOrd="0" presId="urn:microsoft.com/office/officeart/2005/8/layout/list1"/>
-    <dgm:cxn modelId="{8B9821A9-E012-4B85-9CC0-B80F13DE9B77}" type="presParOf" srcId="{A5CFC4D5-4052-43A6-8A33-1928B3128498}" destId="{5F37DCE4-F0EF-451B-844C-561BBB752DDA}" srcOrd="1" destOrd="0" presId="urn:microsoft.com/office/officeart/2005/8/layout/list1"/>
-    <dgm:cxn modelId="{FF311176-4D46-4D12-8320-ECA80A912D14}" type="presParOf" srcId="{541B8D79-3F7F-4D84-949A-1EAA66FB1BD7}" destId="{73D79E5B-2365-4A31-8571-56A99F1AD8FF}" srcOrd="13" destOrd="0" presId="urn:microsoft.com/office/officeart/2005/8/layout/list1"/>
-    <dgm:cxn modelId="{9990B899-D68D-42B7-9F6B-0B080DFB6771}" type="presParOf" srcId="{541B8D79-3F7F-4D84-949A-1EAA66FB1BD7}" destId="{41BC2E9A-4248-42BC-A64B-CAAF0FBA0FB3}" srcOrd="14" destOrd="0" presId="urn:microsoft.com/office/officeart/2005/8/layout/list1"/>
-    <dgm:cxn modelId="{0CA295EF-FC72-4FD5-9270-FD784EE152B1}" type="presParOf" srcId="{541B8D79-3F7F-4D84-949A-1EAA66FB1BD7}" destId="{FD9D1C16-19FF-455B-AFC9-5DBD5EB0AF20}" srcOrd="15" destOrd="0" presId="urn:microsoft.com/office/officeart/2005/8/layout/list1"/>
-    <dgm:cxn modelId="{7A3E294A-2308-4BF0-BDA5-0D16B3D6B2D4}" type="presParOf" srcId="{541B8D79-3F7F-4D84-949A-1EAA66FB1BD7}" destId="{A7E823B8-CDC2-4775-A55B-9EB55214E0A8}" srcOrd="16" destOrd="0" presId="urn:microsoft.com/office/officeart/2005/8/layout/list1"/>
-    <dgm:cxn modelId="{9A5DA3E2-C5A9-49A4-8C82-9E40545D9909}" type="presParOf" srcId="{A7E823B8-CDC2-4775-A55B-9EB55214E0A8}" destId="{20102195-C8C1-4514-88D3-5B37A83812FA}" srcOrd="0" destOrd="0" presId="urn:microsoft.com/office/officeart/2005/8/layout/list1"/>
-    <dgm:cxn modelId="{7A726B13-27BF-4240-885B-CCC6BFEDAB5E}" type="presParOf" srcId="{A7E823B8-CDC2-4775-A55B-9EB55214E0A8}" destId="{30EE6322-66A0-4A37-AFF8-8ECAC310E94A}" srcOrd="1" destOrd="0" presId="urn:microsoft.com/office/officeart/2005/8/layout/list1"/>
-    <dgm:cxn modelId="{918F0267-3595-4F8A-A067-8EAC693FAE5D}" type="presParOf" srcId="{541B8D79-3F7F-4D84-949A-1EAA66FB1BD7}" destId="{45827FF5-8931-4EC1-958F-2FB14438B48D}" srcOrd="17" destOrd="0" presId="urn:microsoft.com/office/officeart/2005/8/layout/list1"/>
-    <dgm:cxn modelId="{72F7C5F4-A3DD-428E-8DED-05C691E32898}" type="presParOf" srcId="{541B8D79-3F7F-4D84-949A-1EAA66FB1BD7}" destId="{46854411-9485-40FF-AA96-6C407C4304C3}" srcOrd="18" destOrd="0" presId="urn:microsoft.com/office/officeart/2005/8/layout/list1"/>
+    <dgm:cxn modelId="{362A3CC8-3A58-480B-81CF-60BC85CB1702}" type="presParOf" srcId="{541B8D79-3F7F-4D84-949A-1EAA66FB1BD7}" destId="{9CA105F4-EDA8-4AFC-A8EC-F370E1154621}" srcOrd="0" destOrd="0" presId="urn:microsoft.com/office/officeart/2005/8/layout/list1"/>
+    <dgm:cxn modelId="{FE5E86C1-FC60-47C7-8FE4-4532096F9C0B}" type="presParOf" srcId="{9CA105F4-EDA8-4AFC-A8EC-F370E1154621}" destId="{E0E98AF7-AA50-4F6A-AC37-973012DA7026}" srcOrd="0" destOrd="0" presId="urn:microsoft.com/office/officeart/2005/8/layout/list1"/>
+    <dgm:cxn modelId="{231668C5-746C-4A22-8408-ADA64CF647B7}" type="presParOf" srcId="{9CA105F4-EDA8-4AFC-A8EC-F370E1154621}" destId="{68D18EA1-1FFF-4444-A131-6E6D5BC65AB5}" srcOrd="1" destOrd="0" presId="urn:microsoft.com/office/officeart/2005/8/layout/list1"/>
+    <dgm:cxn modelId="{D820A843-8013-416A-96B2-2D64F035BA9F}" type="presParOf" srcId="{541B8D79-3F7F-4D84-949A-1EAA66FB1BD7}" destId="{242CF14C-3379-4601-AEA0-15844B36348B}" srcOrd="1" destOrd="0" presId="urn:microsoft.com/office/officeart/2005/8/layout/list1"/>
+    <dgm:cxn modelId="{724A8DF5-688F-4738-9244-935CCAA06A79}" type="presParOf" srcId="{541B8D79-3F7F-4D84-949A-1EAA66FB1BD7}" destId="{A3C52453-F5F9-4E97-ADD7-39C15C755C5B}" srcOrd="2" destOrd="0" presId="urn:microsoft.com/office/officeart/2005/8/layout/list1"/>
+    <dgm:cxn modelId="{FBAE3ABD-6757-4C7B-B35C-9E5D2AAF7D75}" type="presParOf" srcId="{541B8D79-3F7F-4D84-949A-1EAA66FB1BD7}" destId="{E54289F6-02BC-43A2-868E-D4BBBDDAD7FE}" srcOrd="3" destOrd="0" presId="urn:microsoft.com/office/officeart/2005/8/layout/list1"/>
+    <dgm:cxn modelId="{F1314B45-2F4A-41A4-8BFA-7FD5A16BAC3D}" type="presParOf" srcId="{541B8D79-3F7F-4D84-949A-1EAA66FB1BD7}" destId="{E00BDAA2-75F6-457B-829B-D7333DF8F64F}" srcOrd="4" destOrd="0" presId="urn:microsoft.com/office/officeart/2005/8/layout/list1"/>
+    <dgm:cxn modelId="{1377B7B9-4509-4A49-9BC4-91332EBD3562}" type="presParOf" srcId="{E00BDAA2-75F6-457B-829B-D7333DF8F64F}" destId="{C7F07FC5-1FE8-4E63-957D-BE853A83486B}" srcOrd="0" destOrd="0" presId="urn:microsoft.com/office/officeart/2005/8/layout/list1"/>
+    <dgm:cxn modelId="{0154B55B-22E7-47BC-AC26-2058915CA7E5}" type="presParOf" srcId="{E00BDAA2-75F6-457B-829B-D7333DF8F64F}" destId="{FBFDE359-21D9-4AA2-8A36-4A4B49C95B5D}" srcOrd="1" destOrd="0" presId="urn:microsoft.com/office/officeart/2005/8/layout/list1"/>
+    <dgm:cxn modelId="{8CA992DD-D428-490F-A021-C74679C70978}" type="presParOf" srcId="{541B8D79-3F7F-4D84-949A-1EAA66FB1BD7}" destId="{F3B03C14-C1C2-44E7-9CA2-D9F42DF7AB92}" srcOrd="5" destOrd="0" presId="urn:microsoft.com/office/officeart/2005/8/layout/list1"/>
+    <dgm:cxn modelId="{3BADF347-27EE-4C86-8245-A3BA414E5028}" type="presParOf" srcId="{541B8D79-3F7F-4D84-949A-1EAA66FB1BD7}" destId="{5B7F1806-928E-496E-8A9F-3628E49E2E97}" srcOrd="6" destOrd="0" presId="urn:microsoft.com/office/officeart/2005/8/layout/list1"/>
+    <dgm:cxn modelId="{EAD159CF-95A7-497D-9E30-93FBE1ABE816}" type="presParOf" srcId="{541B8D79-3F7F-4D84-949A-1EAA66FB1BD7}" destId="{78D1BF15-311E-40D3-96D0-3C8ACB7E9E3B}" srcOrd="7" destOrd="0" presId="urn:microsoft.com/office/officeart/2005/8/layout/list1"/>
+    <dgm:cxn modelId="{FCFC4224-47FE-4982-B348-C8F5DE8E00AD}" type="presParOf" srcId="{541B8D79-3F7F-4D84-949A-1EAA66FB1BD7}" destId="{A7E823B8-CDC2-4775-A55B-9EB55214E0A8}" srcOrd="8" destOrd="0" presId="urn:microsoft.com/office/officeart/2005/8/layout/list1"/>
+    <dgm:cxn modelId="{A71D5D84-2929-4A7F-9AC9-B9A938E094A8}" type="presParOf" srcId="{A7E823B8-CDC2-4775-A55B-9EB55214E0A8}" destId="{20102195-C8C1-4514-88D3-5B37A83812FA}" srcOrd="0" destOrd="0" presId="urn:microsoft.com/office/officeart/2005/8/layout/list1"/>
+    <dgm:cxn modelId="{FC3077A5-0E48-4EFD-B75D-B393274266E6}" type="presParOf" srcId="{A7E823B8-CDC2-4775-A55B-9EB55214E0A8}" destId="{30EE6322-66A0-4A37-AFF8-8ECAC310E94A}" srcOrd="1" destOrd="0" presId="urn:microsoft.com/office/officeart/2005/8/layout/list1"/>
+    <dgm:cxn modelId="{6582AC94-92F8-430C-9158-A089B7494005}" type="presParOf" srcId="{541B8D79-3F7F-4D84-949A-1EAA66FB1BD7}" destId="{45827FF5-8931-4EC1-958F-2FB14438B48D}" srcOrd="9" destOrd="0" presId="urn:microsoft.com/office/officeart/2005/8/layout/list1"/>
+    <dgm:cxn modelId="{8622AA52-004B-462D-B349-F017A36F6E9A}" type="presParOf" srcId="{541B8D79-3F7F-4D84-949A-1EAA66FB1BD7}" destId="{46854411-9485-40FF-AA96-6C407C4304C3}" srcOrd="10" destOrd="0" presId="urn:microsoft.com/office/officeart/2005/8/layout/list1"/>
+    <dgm:cxn modelId="{5C089473-60BB-46FC-BD43-A0A86D3CED98}" type="presParOf" srcId="{541B8D79-3F7F-4D84-949A-1EAA66FB1BD7}" destId="{CA9577AB-1E4C-46E9-837C-0CFAFBE6C91C}" srcOrd="11" destOrd="0" presId="urn:microsoft.com/office/officeart/2005/8/layout/list1"/>
+    <dgm:cxn modelId="{1283A870-B3EA-4292-A2E6-3AEC0D77F173}" type="presParOf" srcId="{541B8D79-3F7F-4D84-949A-1EAA66FB1BD7}" destId="{82F01AF5-0B76-4308-95D4-494ADAF95BC4}" srcOrd="12" destOrd="0" presId="urn:microsoft.com/office/officeart/2005/8/layout/list1"/>
+    <dgm:cxn modelId="{128AA782-8AA4-4F47-9DAD-2A4591B753E0}" type="presParOf" srcId="{82F01AF5-0B76-4308-95D4-494ADAF95BC4}" destId="{4D69E289-C586-4F0E-BA58-A9F64710D379}" srcOrd="0" destOrd="0" presId="urn:microsoft.com/office/officeart/2005/8/layout/list1"/>
+    <dgm:cxn modelId="{8C82894F-BD7A-44A0-89BB-1CC9D79DC6BC}" type="presParOf" srcId="{82F01AF5-0B76-4308-95D4-494ADAF95BC4}" destId="{89BD58FB-390D-4CDE-A282-0ECA0F33770C}" srcOrd="1" destOrd="0" presId="urn:microsoft.com/office/officeart/2005/8/layout/list1"/>
+    <dgm:cxn modelId="{0ACFF3E6-22CF-4D85-9A82-0A8C114361FD}" type="presParOf" srcId="{541B8D79-3F7F-4D84-949A-1EAA66FB1BD7}" destId="{E7FB066C-95DA-46A7-BE13-3EB90FDC6A85}" srcOrd="13" destOrd="0" presId="urn:microsoft.com/office/officeart/2005/8/layout/list1"/>
+    <dgm:cxn modelId="{0DAA35AE-9346-4342-A2B3-CCFB7D98E30E}" type="presParOf" srcId="{541B8D79-3F7F-4D84-949A-1EAA66FB1BD7}" destId="{7E2D7331-2008-4CFF-BE05-5DB6F177B086}" srcOrd="14" destOrd="0" presId="urn:microsoft.com/office/officeart/2005/8/layout/list1"/>
+    <dgm:cxn modelId="{FB25AD3F-6808-4DB3-94E9-476F9F5F0892}" type="presParOf" srcId="{541B8D79-3F7F-4D84-949A-1EAA66FB1BD7}" destId="{49A4AA14-BC68-49B0-99AE-67ED616408F4}" srcOrd="15" destOrd="0" presId="urn:microsoft.com/office/officeart/2005/8/layout/list1"/>
+    <dgm:cxn modelId="{A997641D-E985-49BB-ADF7-CD4F21EC0B69}" type="presParOf" srcId="{541B8D79-3F7F-4D84-949A-1EAA66FB1BD7}" destId="{F4E3617F-623C-4170-9CFA-357C8761B5DB}" srcOrd="16" destOrd="0" presId="urn:microsoft.com/office/officeart/2005/8/layout/list1"/>
+    <dgm:cxn modelId="{5CF3F037-018E-4E51-8DE6-98D562F2CAB2}" type="presParOf" srcId="{F4E3617F-623C-4170-9CFA-357C8761B5DB}" destId="{122F0A4F-6C50-46C1-A3BC-A48A3A668602}" srcOrd="0" destOrd="0" presId="urn:microsoft.com/office/officeart/2005/8/layout/list1"/>
+    <dgm:cxn modelId="{1D8A233E-180F-418A-BFC7-BC6DF6FCD921}" type="presParOf" srcId="{F4E3617F-623C-4170-9CFA-357C8761B5DB}" destId="{D2A04B1C-ACA9-4935-B7B9-29446F0FC549}" srcOrd="1" destOrd="0" presId="urn:microsoft.com/office/officeart/2005/8/layout/list1"/>
+    <dgm:cxn modelId="{A10466F3-7881-49B5-BFD0-9BE55367563C}" type="presParOf" srcId="{541B8D79-3F7F-4D84-949A-1EAA66FB1BD7}" destId="{EB723E5F-73B1-43E6-8438-1D528503F29F}" srcOrd="17" destOrd="0" presId="urn:microsoft.com/office/officeart/2005/8/layout/list1"/>
+    <dgm:cxn modelId="{C582B4DF-8E17-4962-987E-2031E7A90FD4}" type="presParOf" srcId="{541B8D79-3F7F-4D84-949A-1EAA66FB1BD7}" destId="{A5DC5035-47E6-41A3-8C90-397CE8632653}" srcOrd="18" destOrd="0" presId="urn:microsoft.com/office/officeart/2005/8/layout/list1"/>
   </dgm:cxnLst>
   <dgm:bg/>
   <dgm:whole/>
   <dgm:extLst>
     <a:ext uri="http://schemas.microsoft.com/office/drawing/2008/diagram">
-      <dsp:dataModelExt xmlns:dsp="http://schemas.microsoft.com/office/drawing/2008/diagram" relId="rId6" minVer="http://schemas.openxmlformats.org/drawingml/2006/diagram"/>
+      <dsp:dataModelExt xmlns:dsp="http://schemas.microsoft.com/office/drawing/2008/diagram" relId="rId7" minVer="http://schemas.openxmlformats.org/drawingml/2006/diagram"/>
     </a:ext>
   </dgm:extLst>
 </dgm:dataModel>
@@ -1409,6 +1413,625 @@
       <dsp:cNvGrpSpPr/>
     </dsp:nvGrpSpPr>
     <dsp:grpSpPr/>
+    <dsp:sp modelId="{A3C52453-F5F9-4E97-ADD7-39C15C755C5B}">
+      <dsp:nvSpPr>
+        <dsp:cNvPr id="0" name=""/>
+        <dsp:cNvSpPr/>
+      </dsp:nvSpPr>
+      <dsp:spPr>
+        <a:xfrm>
+          <a:off x="0" y="385559"/>
+          <a:ext cx="7620000" cy="529200"/>
+        </a:xfrm>
+        <a:prstGeom prst="rect">
+          <a:avLst/>
+        </a:prstGeom>
+        <a:solidFill>
+          <a:schemeClr val="lt1">
+            <a:alpha val="90000"/>
+            <a:hueOff val="0"/>
+            <a:satOff val="0"/>
+            <a:lumOff val="0"/>
+            <a:alphaOff val="0"/>
+          </a:schemeClr>
+        </a:solidFill>
+        <a:ln w="12700" cap="flat" cmpd="sng" algn="ctr">
+          <a:solidFill>
+            <a:schemeClr val="accent3">
+              <a:hueOff val="0"/>
+              <a:satOff val="0"/>
+              <a:lumOff val="0"/>
+              <a:alphaOff val="0"/>
+            </a:schemeClr>
+          </a:solidFill>
+          <a:prstDash val="solid"/>
+        </a:ln>
+        <a:effectLst/>
+        <a:sp3d z="-60000" extrusionH="63500" prstMaterial="matte"/>
+      </dsp:spPr>
+      <dsp:style>
+        <a:lnRef idx="1">
+          <a:scrgbClr r="0" g="0" b="0"/>
+        </a:lnRef>
+        <a:fillRef idx="1">
+          <a:scrgbClr r="0" g="0" b="0"/>
+        </a:fillRef>
+        <a:effectRef idx="0">
+          <a:scrgbClr r="0" g="0" b="0"/>
+        </a:effectRef>
+        <a:fontRef idx="minor"/>
+      </dsp:style>
+    </dsp:sp>
+    <dsp:sp modelId="{68D18EA1-1FFF-4444-A131-6E6D5BC65AB5}">
+      <dsp:nvSpPr>
+        <dsp:cNvPr id="0" name=""/>
+        <dsp:cNvSpPr/>
+      </dsp:nvSpPr>
+      <dsp:spPr>
+        <a:xfrm>
+          <a:off x="381000" y="75599"/>
+          <a:ext cx="5334000" cy="619920"/>
+        </a:xfrm>
+        <a:prstGeom prst="roundRect">
+          <a:avLst/>
+        </a:prstGeom>
+        <a:solidFill>
+          <a:schemeClr val="accent3">
+            <a:hueOff val="0"/>
+            <a:satOff val="0"/>
+            <a:lumOff val="0"/>
+            <a:alphaOff val="0"/>
+          </a:schemeClr>
+        </a:solidFill>
+        <a:ln>
+          <a:noFill/>
+        </a:ln>
+        <a:effectLst/>
+        <a:sp3d extrusionH="381000" contourW="38100" prstMaterial="matte">
+          <a:contourClr>
+            <a:schemeClr val="lt1"/>
+          </a:contourClr>
+        </a:sp3d>
+      </dsp:spPr>
+      <dsp:style>
+        <a:lnRef idx="0">
+          <a:scrgbClr r="0" g="0" b="0"/>
+        </a:lnRef>
+        <a:fillRef idx="1">
+          <a:scrgbClr r="0" g="0" b="0"/>
+        </a:fillRef>
+        <a:effectRef idx="0">
+          <a:scrgbClr r="0" g="0" b="0"/>
+        </a:effectRef>
+        <a:fontRef idx="minor">
+          <a:schemeClr val="lt1"/>
+        </a:fontRef>
+      </dsp:style>
+      <dsp:txBody>
+        <a:bodyPr spcFirstLastPara="0" vert="horz" wrap="square" lIns="201613" tIns="0" rIns="201613" bIns="0" numCol="1" spcCol="1270" anchor="ctr" anchorCtr="0">
+          <a:noAutofit/>
+        </a:bodyPr>
+        <a:lstStyle/>
+        <a:p>
+          <a:pPr lvl="0" algn="l" defTabSz="933450">
+            <a:lnSpc>
+              <a:spcPct val="90000"/>
+            </a:lnSpc>
+            <a:spcBef>
+              <a:spcPct val="0"/>
+            </a:spcBef>
+            <a:spcAft>
+              <a:spcPct val="35000"/>
+            </a:spcAft>
+          </a:pPr>
+          <a:r>
+            <a:rPr lang="en-GB" sz="2100" kern="1200" dirty="0" smtClean="0"/>
+            <a:t>Character i.e. names</a:t>
+          </a:r>
+          <a:endParaRPr lang="en-GB" sz="2100" kern="1200" dirty="0"/>
+        </a:p>
+      </dsp:txBody>
+      <dsp:txXfrm>
+        <a:off x="411262" y="105861"/>
+        <a:ext cx="5273476" cy="559396"/>
+      </dsp:txXfrm>
+    </dsp:sp>
+    <dsp:sp modelId="{5B7F1806-928E-496E-8A9F-3628E49E2E97}">
+      <dsp:nvSpPr>
+        <dsp:cNvPr id="0" name=""/>
+        <dsp:cNvSpPr/>
+      </dsp:nvSpPr>
+      <dsp:spPr>
+        <a:xfrm>
+          <a:off x="0" y="1338119"/>
+          <a:ext cx="7620000" cy="529200"/>
+        </a:xfrm>
+        <a:prstGeom prst="rect">
+          <a:avLst/>
+        </a:prstGeom>
+        <a:solidFill>
+          <a:schemeClr val="lt1">
+            <a:alpha val="90000"/>
+            <a:hueOff val="0"/>
+            <a:satOff val="0"/>
+            <a:lumOff val="0"/>
+            <a:alphaOff val="0"/>
+          </a:schemeClr>
+        </a:solidFill>
+        <a:ln w="12700" cap="flat" cmpd="sng" algn="ctr">
+          <a:solidFill>
+            <a:schemeClr val="accent3">
+              <a:hueOff val="1476047"/>
+              <a:satOff val="-11513"/>
+              <a:lumOff val="-294"/>
+              <a:alphaOff val="0"/>
+            </a:schemeClr>
+          </a:solidFill>
+          <a:prstDash val="solid"/>
+        </a:ln>
+        <a:effectLst/>
+        <a:sp3d z="-60000" extrusionH="63500" prstMaterial="matte"/>
+      </dsp:spPr>
+      <dsp:style>
+        <a:lnRef idx="1">
+          <a:scrgbClr r="0" g="0" b="0"/>
+        </a:lnRef>
+        <a:fillRef idx="1">
+          <a:scrgbClr r="0" g="0" b="0"/>
+        </a:fillRef>
+        <a:effectRef idx="0">
+          <a:scrgbClr r="0" g="0" b="0"/>
+        </a:effectRef>
+        <a:fontRef idx="minor"/>
+      </dsp:style>
+    </dsp:sp>
+    <dsp:sp modelId="{FBFDE359-21D9-4AA2-8A36-4A4B49C95B5D}">
+      <dsp:nvSpPr>
+        <dsp:cNvPr id="0" name=""/>
+        <dsp:cNvSpPr/>
+      </dsp:nvSpPr>
+      <dsp:spPr>
+        <a:xfrm>
+          <a:off x="381000" y="1028159"/>
+          <a:ext cx="5334000" cy="619920"/>
+        </a:xfrm>
+        <a:prstGeom prst="roundRect">
+          <a:avLst/>
+        </a:prstGeom>
+        <a:solidFill>
+          <a:schemeClr val="accent3">
+            <a:hueOff val="1476047"/>
+            <a:satOff val="-11513"/>
+            <a:lumOff val="-294"/>
+            <a:alphaOff val="0"/>
+          </a:schemeClr>
+        </a:solidFill>
+        <a:ln>
+          <a:noFill/>
+        </a:ln>
+        <a:effectLst/>
+        <a:sp3d extrusionH="381000" contourW="38100" prstMaterial="matte">
+          <a:contourClr>
+            <a:schemeClr val="lt1"/>
+          </a:contourClr>
+        </a:sp3d>
+      </dsp:spPr>
+      <dsp:style>
+        <a:lnRef idx="0">
+          <a:scrgbClr r="0" g="0" b="0"/>
+        </a:lnRef>
+        <a:fillRef idx="1">
+          <a:scrgbClr r="0" g="0" b="0"/>
+        </a:fillRef>
+        <a:effectRef idx="0">
+          <a:scrgbClr r="0" g="0" b="0"/>
+        </a:effectRef>
+        <a:fontRef idx="minor">
+          <a:schemeClr val="lt1"/>
+        </a:fontRef>
+      </dsp:style>
+      <dsp:txBody>
+        <a:bodyPr spcFirstLastPara="0" vert="horz" wrap="square" lIns="201613" tIns="0" rIns="201613" bIns="0" numCol="1" spcCol="1270" anchor="ctr" anchorCtr="0">
+          <a:noAutofit/>
+        </a:bodyPr>
+        <a:lstStyle/>
+        <a:p>
+          <a:pPr lvl="0" algn="l" defTabSz="933450">
+            <a:lnSpc>
+              <a:spcPct val="90000"/>
+            </a:lnSpc>
+            <a:spcBef>
+              <a:spcPct val="0"/>
+            </a:spcBef>
+            <a:spcAft>
+              <a:spcPct val="35000"/>
+            </a:spcAft>
+          </a:pPr>
+          <a:r>
+            <a:rPr lang="en-GB" sz="2100" kern="1200" dirty="0" smtClean="0"/>
+            <a:t>Numeric (real numbers) i.e. 4.56788</a:t>
+          </a:r>
+          <a:endParaRPr lang="en-GB" sz="2100" kern="1200" dirty="0"/>
+        </a:p>
+      </dsp:txBody>
+      <dsp:txXfrm>
+        <a:off x="411262" y="1058421"/>
+        <a:ext cx="5273476" cy="559396"/>
+      </dsp:txXfrm>
+    </dsp:sp>
+    <dsp:sp modelId="{46854411-9485-40FF-AA96-6C407C4304C3}">
+      <dsp:nvSpPr>
+        <dsp:cNvPr id="0" name=""/>
+        <dsp:cNvSpPr/>
+      </dsp:nvSpPr>
+      <dsp:spPr>
+        <a:xfrm>
+          <a:off x="0" y="2290680"/>
+          <a:ext cx="7620000" cy="529200"/>
+        </a:xfrm>
+        <a:prstGeom prst="rect">
+          <a:avLst/>
+        </a:prstGeom>
+        <a:solidFill>
+          <a:schemeClr val="lt1">
+            <a:alpha val="90000"/>
+            <a:hueOff val="0"/>
+            <a:satOff val="0"/>
+            <a:lumOff val="0"/>
+            <a:alphaOff val="0"/>
+          </a:schemeClr>
+        </a:solidFill>
+        <a:ln w="12700" cap="flat" cmpd="sng" algn="ctr">
+          <a:solidFill>
+            <a:schemeClr val="accent3">
+              <a:hueOff val="2952094"/>
+              <a:satOff val="-23027"/>
+              <a:lumOff val="-588"/>
+              <a:alphaOff val="0"/>
+            </a:schemeClr>
+          </a:solidFill>
+          <a:prstDash val="solid"/>
+        </a:ln>
+        <a:effectLst/>
+        <a:sp3d z="-60000" extrusionH="63500" prstMaterial="matte"/>
+      </dsp:spPr>
+      <dsp:style>
+        <a:lnRef idx="1">
+          <a:scrgbClr r="0" g="0" b="0"/>
+        </a:lnRef>
+        <a:fillRef idx="1">
+          <a:scrgbClr r="0" g="0" b="0"/>
+        </a:fillRef>
+        <a:effectRef idx="0">
+          <a:scrgbClr r="0" g="0" b="0"/>
+        </a:effectRef>
+        <a:fontRef idx="minor"/>
+      </dsp:style>
+    </dsp:sp>
+    <dsp:sp modelId="{30EE6322-66A0-4A37-AFF8-8ECAC310E94A}">
+      <dsp:nvSpPr>
+        <dsp:cNvPr id="0" name=""/>
+        <dsp:cNvSpPr/>
+      </dsp:nvSpPr>
+      <dsp:spPr>
+        <a:xfrm>
+          <a:off x="381000" y="1980719"/>
+          <a:ext cx="5334000" cy="619920"/>
+        </a:xfrm>
+        <a:prstGeom prst="roundRect">
+          <a:avLst/>
+        </a:prstGeom>
+        <a:solidFill>
+          <a:schemeClr val="accent3">
+            <a:hueOff val="2952094"/>
+            <a:satOff val="-23027"/>
+            <a:lumOff val="-588"/>
+            <a:alphaOff val="0"/>
+          </a:schemeClr>
+        </a:solidFill>
+        <a:ln>
+          <a:noFill/>
+        </a:ln>
+        <a:effectLst/>
+        <a:sp3d extrusionH="381000" contourW="38100" prstMaterial="matte">
+          <a:contourClr>
+            <a:schemeClr val="lt1"/>
+          </a:contourClr>
+        </a:sp3d>
+      </dsp:spPr>
+      <dsp:style>
+        <a:lnRef idx="0">
+          <a:scrgbClr r="0" g="0" b="0"/>
+        </a:lnRef>
+        <a:fillRef idx="1">
+          <a:scrgbClr r="0" g="0" b="0"/>
+        </a:fillRef>
+        <a:effectRef idx="0">
+          <a:scrgbClr r="0" g="0" b="0"/>
+        </a:effectRef>
+        <a:fontRef idx="minor">
+          <a:schemeClr val="lt1"/>
+        </a:fontRef>
+      </dsp:style>
+      <dsp:txBody>
+        <a:bodyPr spcFirstLastPara="0" vert="horz" wrap="square" lIns="201613" tIns="0" rIns="201613" bIns="0" numCol="1" spcCol="1270" anchor="ctr" anchorCtr="0">
+          <a:noAutofit/>
+        </a:bodyPr>
+        <a:lstStyle/>
+        <a:p>
+          <a:pPr lvl="0" algn="l" defTabSz="933450">
+            <a:lnSpc>
+              <a:spcPct val="90000"/>
+            </a:lnSpc>
+            <a:spcBef>
+              <a:spcPct val="0"/>
+            </a:spcBef>
+            <a:spcAft>
+              <a:spcPct val="35000"/>
+            </a:spcAft>
+          </a:pPr>
+          <a:r>
+            <a:rPr lang="en-GB" sz="2100" kern="1200" dirty="0" smtClean="0"/>
+            <a:t>Factor</a:t>
+          </a:r>
+          <a:endParaRPr lang="en-GB" sz="2100" kern="1200" dirty="0"/>
+        </a:p>
+      </dsp:txBody>
+      <dsp:txXfrm>
+        <a:off x="411262" y="2010981"/>
+        <a:ext cx="5273476" cy="559396"/>
+      </dsp:txXfrm>
+    </dsp:sp>
+    <dsp:sp modelId="{7E2D7331-2008-4CFF-BE05-5DB6F177B086}">
+      <dsp:nvSpPr>
+        <dsp:cNvPr id="0" name=""/>
+        <dsp:cNvSpPr/>
+      </dsp:nvSpPr>
+      <dsp:spPr>
+        <a:xfrm>
+          <a:off x="0" y="3243240"/>
+          <a:ext cx="7620000" cy="529200"/>
+        </a:xfrm>
+        <a:prstGeom prst="rect">
+          <a:avLst/>
+        </a:prstGeom>
+        <a:solidFill>
+          <a:schemeClr val="lt1">
+            <a:alpha val="90000"/>
+            <a:hueOff val="0"/>
+            <a:satOff val="0"/>
+            <a:lumOff val="0"/>
+            <a:alphaOff val="0"/>
+          </a:schemeClr>
+        </a:solidFill>
+        <a:ln w="12700" cap="flat" cmpd="sng" algn="ctr">
+          <a:solidFill>
+            <a:schemeClr val="accent3">
+              <a:hueOff val="4428140"/>
+              <a:satOff val="-34540"/>
+              <a:lumOff val="-883"/>
+              <a:alphaOff val="0"/>
+            </a:schemeClr>
+          </a:solidFill>
+          <a:prstDash val="solid"/>
+        </a:ln>
+        <a:effectLst/>
+        <a:sp3d z="-60000" extrusionH="63500" prstMaterial="matte"/>
+      </dsp:spPr>
+      <dsp:style>
+        <a:lnRef idx="1">
+          <a:scrgbClr r="0" g="0" b="0"/>
+        </a:lnRef>
+        <a:fillRef idx="1">
+          <a:scrgbClr r="0" g="0" b="0"/>
+        </a:fillRef>
+        <a:effectRef idx="0">
+          <a:scrgbClr r="0" g="0" b="0"/>
+        </a:effectRef>
+        <a:fontRef idx="minor"/>
+      </dsp:style>
+    </dsp:sp>
+    <dsp:sp modelId="{89BD58FB-390D-4CDE-A282-0ECA0F33770C}">
+      <dsp:nvSpPr>
+        <dsp:cNvPr id="0" name=""/>
+        <dsp:cNvSpPr/>
+      </dsp:nvSpPr>
+      <dsp:spPr>
+        <a:xfrm>
+          <a:off x="381000" y="2933280"/>
+          <a:ext cx="5334000" cy="619920"/>
+        </a:xfrm>
+        <a:prstGeom prst="roundRect">
+          <a:avLst/>
+        </a:prstGeom>
+        <a:solidFill>
+          <a:schemeClr val="accent3">
+            <a:hueOff val="4428140"/>
+            <a:satOff val="-34540"/>
+            <a:lumOff val="-883"/>
+            <a:alphaOff val="0"/>
+          </a:schemeClr>
+        </a:solidFill>
+        <a:ln>
+          <a:noFill/>
+        </a:ln>
+        <a:effectLst/>
+        <a:sp3d extrusionH="381000" contourW="38100" prstMaterial="matte">
+          <a:contourClr>
+            <a:schemeClr val="lt1"/>
+          </a:contourClr>
+        </a:sp3d>
+      </dsp:spPr>
+      <dsp:style>
+        <a:lnRef idx="0">
+          <a:scrgbClr r="0" g="0" b="0"/>
+        </a:lnRef>
+        <a:fillRef idx="1">
+          <a:scrgbClr r="0" g="0" b="0"/>
+        </a:fillRef>
+        <a:effectRef idx="0">
+          <a:scrgbClr r="0" g="0" b="0"/>
+        </a:effectRef>
+        <a:fontRef idx="minor">
+          <a:schemeClr val="lt1"/>
+        </a:fontRef>
+      </dsp:style>
+      <dsp:txBody>
+        <a:bodyPr spcFirstLastPara="0" vert="horz" wrap="square" lIns="201613" tIns="0" rIns="201613" bIns="0" numCol="1" spcCol="1270" anchor="ctr" anchorCtr="0">
+          <a:noAutofit/>
+        </a:bodyPr>
+        <a:lstStyle/>
+        <a:p>
+          <a:pPr lvl="0" algn="l" defTabSz="933450">
+            <a:lnSpc>
+              <a:spcPct val="90000"/>
+            </a:lnSpc>
+            <a:spcBef>
+              <a:spcPct val="0"/>
+            </a:spcBef>
+            <a:spcAft>
+              <a:spcPct val="35000"/>
+            </a:spcAft>
+          </a:pPr>
+          <a:r>
+            <a:rPr lang="en-GB" sz="2100" kern="1200" dirty="0" smtClean="0"/>
+            <a:t>Vector</a:t>
+          </a:r>
+          <a:endParaRPr lang="en-GB" sz="2100" kern="1200" dirty="0"/>
+        </a:p>
+      </dsp:txBody>
+      <dsp:txXfrm>
+        <a:off x="411262" y="2963542"/>
+        <a:ext cx="5273476" cy="559396"/>
+      </dsp:txXfrm>
+    </dsp:sp>
+    <dsp:sp modelId="{A5DC5035-47E6-41A3-8C90-397CE8632653}">
+      <dsp:nvSpPr>
+        <dsp:cNvPr id="0" name=""/>
+        <dsp:cNvSpPr/>
+      </dsp:nvSpPr>
+      <dsp:spPr>
+        <a:xfrm>
+          <a:off x="0" y="4195800"/>
+          <a:ext cx="7620000" cy="529200"/>
+        </a:xfrm>
+        <a:prstGeom prst="rect">
+          <a:avLst/>
+        </a:prstGeom>
+        <a:solidFill>
+          <a:schemeClr val="lt1">
+            <a:alpha val="90000"/>
+            <a:hueOff val="0"/>
+            <a:satOff val="0"/>
+            <a:lumOff val="0"/>
+            <a:alphaOff val="0"/>
+          </a:schemeClr>
+        </a:solidFill>
+        <a:ln w="12700" cap="flat" cmpd="sng" algn="ctr">
+          <a:solidFill>
+            <a:schemeClr val="accent3">
+              <a:hueOff val="5904187"/>
+              <a:satOff val="-46054"/>
+              <a:lumOff val="-1177"/>
+              <a:alphaOff val="0"/>
+            </a:schemeClr>
+          </a:solidFill>
+          <a:prstDash val="solid"/>
+        </a:ln>
+        <a:effectLst/>
+        <a:sp3d z="-60000" extrusionH="63500" prstMaterial="matte"/>
+      </dsp:spPr>
+      <dsp:style>
+        <a:lnRef idx="1">
+          <a:scrgbClr r="0" g="0" b="0"/>
+        </a:lnRef>
+        <a:fillRef idx="1">
+          <a:scrgbClr r="0" g="0" b="0"/>
+        </a:fillRef>
+        <a:effectRef idx="0">
+          <a:scrgbClr r="0" g="0" b="0"/>
+        </a:effectRef>
+        <a:fontRef idx="minor"/>
+      </dsp:style>
+    </dsp:sp>
+    <dsp:sp modelId="{D2A04B1C-ACA9-4935-B7B9-29446F0FC549}">
+      <dsp:nvSpPr>
+        <dsp:cNvPr id="0" name=""/>
+        <dsp:cNvSpPr/>
+      </dsp:nvSpPr>
+      <dsp:spPr>
+        <a:xfrm>
+          <a:off x="381000" y="3885840"/>
+          <a:ext cx="5334000" cy="619920"/>
+        </a:xfrm>
+        <a:prstGeom prst="roundRect">
+          <a:avLst/>
+        </a:prstGeom>
+        <a:solidFill>
+          <a:schemeClr val="accent3">
+            <a:hueOff val="5904187"/>
+            <a:satOff val="-46054"/>
+            <a:lumOff val="-1177"/>
+            <a:alphaOff val="0"/>
+          </a:schemeClr>
+        </a:solidFill>
+        <a:ln>
+          <a:noFill/>
+        </a:ln>
+        <a:effectLst/>
+        <a:sp3d extrusionH="381000" contourW="38100" prstMaterial="matte">
+          <a:contourClr>
+            <a:schemeClr val="lt1"/>
+          </a:contourClr>
+        </a:sp3d>
+      </dsp:spPr>
+      <dsp:style>
+        <a:lnRef idx="0">
+          <a:scrgbClr r="0" g="0" b="0"/>
+        </a:lnRef>
+        <a:fillRef idx="1">
+          <a:scrgbClr r="0" g="0" b="0"/>
+        </a:fillRef>
+        <a:effectRef idx="0">
+          <a:scrgbClr r="0" g="0" b="0"/>
+        </a:effectRef>
+        <a:fontRef idx="minor">
+          <a:schemeClr val="lt1"/>
+        </a:fontRef>
+      </dsp:style>
+      <dsp:txBody>
+        <a:bodyPr spcFirstLastPara="0" vert="horz" wrap="square" lIns="201613" tIns="0" rIns="201613" bIns="0" numCol="1" spcCol="1270" anchor="ctr" anchorCtr="0">
+          <a:noAutofit/>
+        </a:bodyPr>
+        <a:lstStyle/>
+        <a:p>
+          <a:pPr lvl="0" algn="l" defTabSz="933450">
+            <a:lnSpc>
+              <a:spcPct val="90000"/>
+            </a:lnSpc>
+            <a:spcBef>
+              <a:spcPct val="0"/>
+            </a:spcBef>
+            <a:spcAft>
+              <a:spcPct val="35000"/>
+            </a:spcAft>
+          </a:pPr>
+          <a:r>
+            <a:rPr lang="en-GB" sz="2100" kern="1200" dirty="0" smtClean="0"/>
+            <a:t>Logical i.e.</a:t>
+          </a:r>
+          <a:r>
+            <a:rPr lang="en-GB" sz="2100" kern="1200" dirty="0" smtClean="0"/>
+            <a:t> True False</a:t>
+          </a:r>
+          <a:endParaRPr lang="en-GB" sz="2100" kern="1200" dirty="0"/>
+        </a:p>
+      </dsp:txBody>
+      <dsp:txXfrm>
+        <a:off x="411262" y="3916102"/>
+        <a:ext cx="5273476" cy="559396"/>
+      </dsp:txXfrm>
+    </dsp:sp>
   </dsp:spTree>
 </dsp:drawing>
 </file>
@@ -2858,7 +3481,7 @@
           <a:p>
             <a:fld id="{4B6D9551-6B67-49DB-9CB3-9D35DF2DDFA8}" type="datetimeFigureOut">
               <a:rPr lang="en-GB" smtClean="0"/>
-              <a:t>06/02/2014</a:t>
+              <a:t>09/02/2014</a:t>
             </a:fld>
             <a:endParaRPr lang="en-GB"/>
           </a:p>
@@ -3662,6 +4285,98 @@
           <a:p>
             <a:r>
               <a:rPr lang="en-GB" dirty="0" smtClean="0"/>
+              <a:t>Classes</a:t>
+            </a:r>
+            <a:r>
+              <a:rPr lang="en-GB" baseline="0" dirty="0" smtClean="0"/>
+              <a:t> of r </a:t>
+            </a:r>
+            <a:endParaRPr lang="en-GB" dirty="0"/>
+          </a:p>
+        </p:txBody>
+      </p:sp>
+      <p:sp>
+        <p:nvSpPr>
+          <p:cNvPr id="4" name="Slide Number Placeholder 3"/>
+          <p:cNvSpPr>
+            <a:spLocks noGrp="1"/>
+          </p:cNvSpPr>
+          <p:nvPr>
+            <p:ph type="sldNum" sz="quarter" idx="10"/>
+          </p:nvPr>
+        </p:nvSpPr>
+        <p:spPr/>
+        <p:txBody>
+          <a:bodyPr/>
+          <a:lstStyle/>
+          <a:p>
+            <a:fld id="{E41CC398-9A54-47C5-AA2E-A4C346B64DD8}" type="slidenum">
+              <a:rPr lang="en-GB" smtClean="0"/>
+              <a:t>9</a:t>
+            </a:fld>
+            <a:endParaRPr lang="en-GB"/>
+          </a:p>
+        </p:txBody>
+      </p:sp>
+    </p:spTree>
+    <p:extLst>
+      <p:ext uri="{BB962C8B-B14F-4D97-AF65-F5344CB8AC3E}">
+        <p14:creationId xmlns:p14="http://schemas.microsoft.com/office/powerpoint/2010/main" val="1698249795"/>
+      </p:ext>
+    </p:extLst>
+  </p:cSld>
+  <p:clrMapOvr>
+    <a:masterClrMapping/>
+  </p:clrMapOvr>
+</p:notes>
+</file>
+
+<file path=ppt/notesSlides/notesSlide6.xml><?xml version="1.0" encoding="utf-8"?>
+<p:notes xmlns:a="http://schemas.openxmlformats.org/drawingml/2006/main" xmlns:r="http://schemas.openxmlformats.org/officeDocument/2006/relationships" xmlns:p="http://schemas.openxmlformats.org/presentationml/2006/main">
+  <p:cSld>
+    <p:spTree>
+      <p:nvGrpSpPr>
+        <p:cNvPr id="1" name=""/>
+        <p:cNvGrpSpPr/>
+        <p:nvPr/>
+      </p:nvGrpSpPr>
+      <p:grpSpPr>
+        <a:xfrm>
+          <a:off x="0" y="0"/>
+          <a:ext cx="0" cy="0"/>
+          <a:chOff x="0" y="0"/>
+          <a:chExt cx="0" cy="0"/>
+        </a:xfrm>
+      </p:grpSpPr>
+      <p:sp>
+        <p:nvSpPr>
+          <p:cNvPr id="2" name="Slide Image Placeholder 1"/>
+          <p:cNvSpPr>
+            <a:spLocks noGrp="1" noRot="1" noChangeAspect="1"/>
+          </p:cNvSpPr>
+          <p:nvPr>
+            <p:ph type="sldImg"/>
+          </p:nvPr>
+        </p:nvSpPr>
+        <p:spPr/>
+      </p:sp>
+      <p:sp>
+        <p:nvSpPr>
+          <p:cNvPr id="3" name="Notes Placeholder 2"/>
+          <p:cNvSpPr>
+            <a:spLocks noGrp="1"/>
+          </p:cNvSpPr>
+          <p:nvPr>
+            <p:ph type="body" idx="1"/>
+          </p:nvPr>
+        </p:nvSpPr>
+        <p:spPr/>
+        <p:txBody>
+          <a:bodyPr/>
+          <a:lstStyle/>
+          <a:p>
+            <a:r>
+              <a:rPr lang="en-GB" dirty="0" smtClean="0"/>
               <a:t># list rows of data that have missing values </a:t>
             </a:r>
             <a:br>
@@ -3925,7 +4640,7 @@
           <a:p>
             <a:fld id="{AD333900-FE21-4816-BC6F-099122D1A369}" type="datetimeFigureOut">
               <a:rPr lang="en-GB" smtClean="0"/>
-              <a:t>06/02/2014</a:t>
+              <a:t>09/02/2014</a:t>
             </a:fld>
             <a:endParaRPr lang="en-GB"/>
           </a:p>
@@ -4102,7 +4817,7 @@
           <a:p>
             <a:fld id="{AD333900-FE21-4816-BC6F-099122D1A369}" type="datetimeFigureOut">
               <a:rPr lang="en-GB" smtClean="0"/>
-              <a:t>06/02/2014</a:t>
+              <a:t>09/02/2014</a:t>
             </a:fld>
             <a:endParaRPr lang="en-GB"/>
           </a:p>
@@ -4289,7 +5004,7 @@
           <a:p>
             <a:fld id="{AD333900-FE21-4816-BC6F-099122D1A369}" type="datetimeFigureOut">
               <a:rPr lang="en-GB" smtClean="0"/>
-              <a:t>06/02/2014</a:t>
+              <a:t>09/02/2014</a:t>
             </a:fld>
             <a:endParaRPr lang="en-GB"/>
           </a:p>
@@ -4466,7 +5181,7 @@
           <a:p>
             <a:fld id="{AD333900-FE21-4816-BC6F-099122D1A369}" type="datetimeFigureOut">
               <a:rPr lang="en-GB" smtClean="0"/>
-              <a:t>06/02/2014</a:t>
+              <a:t>09/02/2014</a:t>
             </a:fld>
             <a:endParaRPr lang="en-GB"/>
           </a:p>
@@ -4719,7 +5434,7 @@
           <a:p>
             <a:fld id="{AD333900-FE21-4816-BC6F-099122D1A369}" type="datetimeFigureOut">
               <a:rPr lang="en-GB" smtClean="0"/>
-              <a:t>06/02/2014</a:t>
+              <a:t>09/02/2014</a:t>
             </a:fld>
             <a:endParaRPr lang="en-GB"/>
           </a:p>
@@ -5014,7 +5729,7 @@
           <a:p>
             <a:fld id="{AD333900-FE21-4816-BC6F-099122D1A369}" type="datetimeFigureOut">
               <a:rPr lang="en-GB" smtClean="0"/>
-              <a:t>06/02/2014</a:t>
+              <a:t>09/02/2014</a:t>
             </a:fld>
             <a:endParaRPr lang="en-GB"/>
           </a:p>
@@ -5455,7 +6170,7 @@
           <a:p>
             <a:fld id="{AD333900-FE21-4816-BC6F-099122D1A369}" type="datetimeFigureOut">
               <a:rPr lang="en-GB" smtClean="0"/>
-              <a:t>06/02/2014</a:t>
+              <a:t>09/02/2014</a:t>
             </a:fld>
             <a:endParaRPr lang="en-GB"/>
           </a:p>
@@ -5580,7 +6295,7 @@
           <a:p>
             <a:fld id="{AD333900-FE21-4816-BC6F-099122D1A369}" type="datetimeFigureOut">
               <a:rPr lang="en-GB" smtClean="0"/>
-              <a:t>06/02/2014</a:t>
+              <a:t>09/02/2014</a:t>
             </a:fld>
             <a:endParaRPr lang="en-GB"/>
           </a:p>
@@ -5682,7 +6397,7 @@
           <a:p>
             <a:fld id="{AD333900-FE21-4816-BC6F-099122D1A369}" type="datetimeFigureOut">
               <a:rPr lang="en-GB" smtClean="0"/>
-              <a:t>06/02/2014</a:t>
+              <a:t>09/02/2014</a:t>
             </a:fld>
             <a:endParaRPr lang="en-GB"/>
           </a:p>
@@ -5883,7 +6598,7 @@
           <a:p>
             <a:fld id="{AD333900-FE21-4816-BC6F-099122D1A369}" type="datetimeFigureOut">
               <a:rPr lang="en-GB" smtClean="0"/>
-              <a:t>06/02/2014</a:t>
+              <a:t>09/02/2014</a:t>
             </a:fld>
             <a:endParaRPr lang="en-GB"/>
           </a:p>
@@ -6213,7 +6928,7 @@
           <a:p>
             <a:fld id="{AD333900-FE21-4816-BC6F-099122D1A369}" type="datetimeFigureOut">
               <a:rPr lang="en-GB" smtClean="0"/>
-              <a:t>06/02/2014</a:t>
+              <a:t>09/02/2014</a:t>
             </a:fld>
             <a:endParaRPr lang="en-GB"/>
           </a:p>
@@ -6604,7 +7319,7 @@
           <a:p>
             <a:fld id="{AD333900-FE21-4816-BC6F-099122D1A369}" type="datetimeFigureOut">
               <a:rPr lang="en-GB" smtClean="0"/>
-              <a:t>06/02/2014</a:t>
+              <a:t>09/02/2014</a:t>
             </a:fld>
             <a:endParaRPr lang="en-GB"/>
           </a:p>
@@ -8948,6 +9663,41 @@
             <a:r>
               <a:rPr lang="en-GB" i="1" dirty="0"/>
               <a:t>") </a:t>
+            </a:r>
+            <a:endParaRPr lang="en-GB" i="1" dirty="0" smtClean="0"/>
+          </a:p>
+          <a:p>
+            <a:r>
+              <a:rPr lang="en-GB" i="1" dirty="0" smtClean="0"/>
+              <a:t>Saving a data frame as an </a:t>
+            </a:r>
+            <a:r>
+              <a:rPr lang="en-GB" i="1" dirty="0" err="1" smtClean="0"/>
+              <a:t>rda</a:t>
+            </a:r>
+            <a:endParaRPr lang="en-GB" i="1" dirty="0" smtClean="0"/>
+          </a:p>
+          <a:p>
+            <a:pPr lvl="1"/>
+            <a:r>
+              <a:rPr lang="en-GB" i="1" dirty="0" smtClean="0"/>
+              <a:t>Save(</a:t>
+            </a:r>
+            <a:r>
+              <a:rPr lang="en-GB" i="1" dirty="0" err="1" smtClean="0"/>
+              <a:t>data.frame</a:t>
+            </a:r>
+            <a:r>
+              <a:rPr lang="en-GB" i="1" dirty="0" smtClean="0"/>
+              <a:t>, “</a:t>
+            </a:r>
+            <a:r>
+              <a:rPr lang="en-GB" i="1" dirty="0" err="1" smtClean="0"/>
+              <a:t>dataset.rda</a:t>
+            </a:r>
+            <a:r>
+              <a:rPr lang="en-GB" i="1" dirty="0" smtClean="0"/>
+              <a:t>”)</a:t>
             </a:r>
             <a:endParaRPr lang="en-GB" i="1" dirty="0" smtClean="0"/>
           </a:p>
@@ -11786,7 +12536,7 @@
             <p:ph idx="1"/>
             <p:extLst>
               <p:ext uri="{D42A27DB-BD31-4B8C-83A1-F6EECF244321}">
-                <p14:modId xmlns:p14="http://schemas.microsoft.com/office/powerpoint/2010/main" val="1993183014"/>
+                <p14:modId xmlns:p14="http://schemas.microsoft.com/office/powerpoint/2010/main" val="2277131964"/>
               </p:ext>
             </p:extLst>
           </p:nvPr>
@@ -11797,7 +12547,7 @@
         </p:xfrm>
         <a:graphic>
           <a:graphicData uri="http://schemas.openxmlformats.org/drawingml/2006/diagram">
-            <dgm:relIds xmlns:dgm="http://schemas.openxmlformats.org/drawingml/2006/diagram" xmlns:r="http://schemas.openxmlformats.org/officeDocument/2006/relationships" r:dm="rId2" r:lo="rId3" r:qs="rId4" r:cs="rId5"/>
+            <dgm:relIds xmlns:dgm="http://schemas.openxmlformats.org/drawingml/2006/diagram" xmlns:r="http://schemas.openxmlformats.org/officeDocument/2006/relationships" r:dm="rId3" r:lo="rId4" r:qs="rId5" r:cs="rId6"/>
           </a:graphicData>
         </a:graphic>
       </p:graphicFrame>

</xml_diff>